<commit_message>
add projects into springboard directory
</commit_message>
<xml_diff>
--- a/31.3.2 Data_StoryTelling/Presentation.pptx
+++ b/31.3.2 Data_StoryTelling/Presentation.pptx
@@ -112,6 +112,11 @@
       </a:defRPr>
     </a:lvl9pPr>
   </p:defaultTextStyle>
+  <p:extLst>
+    <p:ext uri="{EFAFB233-063F-42B5-8137-9DF3F51BA10A}">
+      <p15:sldGuideLst xmlns:p15="http://schemas.microsoft.com/office/powerpoint/2012/main"/>
+    </p:ext>
+  </p:extLst>
 </p:presentation>
 </file>
 
@@ -285,7 +290,7 @@
             <a:fld id="{87DE6118-2437-4B30-8E3C-4D2BE6020583}" type="datetimeFigureOut">
               <a:rPr lang="en-US" dirty="0"/>
               <a:pPr/>
-              <a:t>12/11/23</a:t>
+              <a:t>12/14/23</a:t>
             </a:fld>
             <a:endParaRPr lang="en-US" dirty="0"/>
           </a:p>
@@ -611,7 +616,7 @@
           <a:p>
             <a:fld id="{87DE6118-2437-4B30-8E3C-4D2BE6020583}" type="datetimeFigureOut">
               <a:rPr lang="en-US" dirty="0"/>
-              <a:t>12/11/23</a:t>
+              <a:t>12/14/23</a:t>
             </a:fld>
             <a:endParaRPr lang="en-US" dirty="0"/>
           </a:p>
@@ -786,7 +791,7 @@
           <a:p>
             <a:fld id="{87DE6118-2437-4B30-8E3C-4D2BE6020583}" type="datetimeFigureOut">
               <a:rPr lang="en-US" dirty="0"/>
-              <a:t>12/11/23</a:t>
+              <a:t>12/14/23</a:t>
             </a:fld>
             <a:endParaRPr lang="en-US" dirty="0"/>
           </a:p>
@@ -951,7 +956,7 @@
           <a:p>
             <a:fld id="{87DE6118-2437-4B30-8E3C-4D2BE6020583}" type="datetimeFigureOut">
               <a:rPr lang="en-US" dirty="0"/>
-              <a:t>12/11/23</a:t>
+              <a:t>12/14/23</a:t>
             </a:fld>
             <a:endParaRPr lang="en-US" dirty="0"/>
           </a:p>
@@ -1224,7 +1229,7 @@
             <a:fld id="{87DE6118-2437-4B30-8E3C-4D2BE6020583}" type="datetimeFigureOut">
               <a:rPr lang="en-US" dirty="0"/>
               <a:pPr/>
-              <a:t>12/11/23</a:t>
+              <a:t>12/14/23</a:t>
             </a:fld>
             <a:endParaRPr lang="en-US" dirty="0"/>
           </a:p>
@@ -1614,7 +1619,7 @@
           <a:p>
             <a:fld id="{87DE6118-2437-4B30-8E3C-4D2BE6020583}" type="datetimeFigureOut">
               <a:rPr lang="en-US" dirty="0"/>
-              <a:t>12/11/23</a:t>
+              <a:t>12/14/23</a:t>
             </a:fld>
             <a:endParaRPr lang="en-US" dirty="0"/>
           </a:p>
@@ -2086,7 +2091,7 @@
           <a:p>
             <a:fld id="{87DE6118-2437-4B30-8E3C-4D2BE6020583}" type="datetimeFigureOut">
               <a:rPr lang="en-US" dirty="0"/>
-              <a:t>12/11/23</a:t>
+              <a:t>12/14/23</a:t>
             </a:fld>
             <a:endParaRPr lang="en-US" dirty="0"/>
           </a:p>
@@ -2199,7 +2204,7 @@
           <a:p>
             <a:fld id="{87DE6118-2437-4B30-8E3C-4D2BE6020583}" type="datetimeFigureOut">
               <a:rPr lang="en-US" dirty="0"/>
-              <a:t>12/11/23</a:t>
+              <a:t>12/14/23</a:t>
             </a:fld>
             <a:endParaRPr lang="en-US" dirty="0"/>
           </a:p>
@@ -2289,7 +2294,7 @@
           <a:p>
             <a:fld id="{87DE6118-2437-4B30-8E3C-4D2BE6020583}" type="datetimeFigureOut">
               <a:rPr lang="en-US" dirty="0"/>
-              <a:t>12/11/23</a:t>
+              <a:t>12/14/23</a:t>
             </a:fld>
             <a:endParaRPr lang="en-US" dirty="0"/>
           </a:p>
@@ -2631,7 +2636,7 @@
             <a:fld id="{87DE6118-2437-4B30-8E3C-4D2BE6020583}" type="datetimeFigureOut">
               <a:rPr lang="en-US" dirty="0"/>
               <a:pPr/>
-              <a:t>12/11/23</a:t>
+              <a:t>12/14/23</a:t>
             </a:fld>
             <a:endParaRPr lang="en-US" dirty="0"/>
           </a:p>
@@ -3016,7 +3021,7 @@
             <a:fld id="{87DE6118-2437-4B30-8E3C-4D2BE6020583}" type="datetimeFigureOut">
               <a:rPr lang="en-US" dirty="0"/>
               <a:pPr/>
-              <a:t>12/11/23</a:t>
+              <a:t>12/14/23</a:t>
             </a:fld>
             <a:endParaRPr lang="en-US" dirty="0"/>
           </a:p>
@@ -3291,7 +3296,7 @@
             <a:fld id="{87DE6118-2437-4B30-8E3C-4D2BE6020583}" type="datetimeFigureOut">
               <a:rPr lang="en-US" dirty="0"/>
               <a:pPr/>
-              <a:t>12/11/23</a:t>
+              <a:t>12/14/23</a:t>
             </a:fld>
             <a:endParaRPr lang="en-US" dirty="0"/>
           </a:p>
@@ -4064,7 +4069,7 @@
                 <a:latin typeface="Arial" panose="020B0604020202020204" pitchFamily="34" charset="0"/>
                 <a:cs typeface="Arial" panose="020B0604020202020204" pitchFamily="34" charset="0"/>
               </a:rPr>
-              <a:t>provide insights into Hulu's content trends and what they mean for content creators and producers.</a:t>
+              <a:t>provide insights into Hulu's content trends which mean for content creators and producers.</a:t>
             </a:r>
           </a:p>
           <a:p>
@@ -4091,7 +4096,7 @@
                 <a:latin typeface="Arial" panose="020B0604020202020204" pitchFamily="34" charset="0"/>
                 <a:cs typeface="Arial" panose="020B0604020202020204" pitchFamily="34" charset="0"/>
               </a:rPr>
-              <a:t>The dataset from Hulu provides details on various show attributes such as genre, duration, and production companies in 2017. It contains information about 1000 entries  Each entry represents a show or film and includes various details such as genre, ratings, episode count, and more. Key columns in the dataset include:</a:t>
+              <a:t>The dataset from Hulu provides details on various show attributes such as genre, duration, and production companies in 2017. It contains information about 1000 entries . Each entry represents a show or film and includes various details such as genre, ratings, episode count, and more. Key columns in the dataset include:</a:t>
             </a:r>
           </a:p>
           <a:p>
@@ -4287,7 +4292,7 @@
                 <a:latin typeface="Arial" panose="020B0604020202020204" pitchFamily="34" charset="0"/>
                 <a:cs typeface="Arial" panose="020B0604020202020204" pitchFamily="34" charset="0"/>
               </a:rPr>
-              <a:t>Content creators and producers can utilize this data to identify popular genres or themes that are currently in demand among Hulu's user base. It can help them make informed decisions about what type of content to produce or pitch to the platform.</a:t>
+              <a:t>Content creators and producers can rely this data to identify popular genres or themes that are currently in demand among Hulu's user base. It can help them make informed decisions about what type of content to produce or pitch to the platform.</a:t>
             </a:r>
           </a:p>
           <a:p>
@@ -4505,7 +4510,21 @@
                 <a:effectLst/>
                 <a:latin typeface="Söhne"/>
               </a:rPr>
-              <a:t>Hulu's Diverse Genre Landscape</a:t>
+              <a:t>Hulu's </a:t>
+            </a:r>
+            <a:r>
+              <a:rPr lang="en-SG" sz="3400" b="1" i="0">
+                <a:effectLst/>
+                <a:latin typeface="Söhne"/>
+              </a:rPr>
+              <a:t>Diverse Genres </a:t>
+            </a:r>
+            <a:r>
+              <a:rPr lang="en-SG" sz="3400" b="1" i="0" dirty="0">
+                <a:effectLst/>
+                <a:latin typeface="Söhne"/>
+              </a:rPr>
+              <a:t>Landscape</a:t>
             </a:r>
           </a:p>
         </p:txBody>
@@ -5389,7 +5408,51 @@
                 <a:latin typeface="Arial" panose="020B0604020202020204" pitchFamily="34" charset="0"/>
                 <a:cs typeface="Arial" panose="020B0604020202020204" pitchFamily="34" charset="0"/>
               </a:rPr>
-              <a:t>: Genres such as Anime and Teen have longer series on average, which could indicate a dedicated audience that engages with content over an extended period.</a:t>
+              <a:t>: Genres such as </a:t>
+            </a:r>
+            <a:r>
+              <a:rPr lang="en-SG" sz="1500" b="1" i="0" dirty="0">
+                <a:solidFill>
+                  <a:srgbClr val="374151"/>
+                </a:solidFill>
+                <a:effectLst/>
+                <a:latin typeface="Arial" panose="020B0604020202020204" pitchFamily="34" charset="0"/>
+                <a:cs typeface="Arial" panose="020B0604020202020204" pitchFamily="34" charset="0"/>
+              </a:rPr>
+              <a:t>Anime</a:t>
+            </a:r>
+            <a:r>
+              <a:rPr lang="en-SG" sz="1500" b="0" i="0" dirty="0">
+                <a:solidFill>
+                  <a:srgbClr val="374151"/>
+                </a:solidFill>
+                <a:effectLst/>
+                <a:latin typeface="Arial" panose="020B0604020202020204" pitchFamily="34" charset="0"/>
+                <a:cs typeface="Arial" panose="020B0604020202020204" pitchFamily="34" charset="0"/>
+              </a:rPr>
+              <a:t> and </a:t>
+            </a:r>
+            <a:r>
+              <a:rPr lang="en-SG" sz="1500" b="1" i="0" dirty="0">
+                <a:solidFill>
+                  <a:srgbClr val="374151"/>
+                </a:solidFill>
+                <a:effectLst/>
+                <a:latin typeface="Arial" panose="020B0604020202020204" pitchFamily="34" charset="0"/>
+                <a:cs typeface="Arial" panose="020B0604020202020204" pitchFamily="34" charset="0"/>
+              </a:rPr>
+              <a:t>Teen</a:t>
+            </a:r>
+            <a:r>
+              <a:rPr lang="en-SG" sz="1500" b="0" i="0" dirty="0">
+                <a:solidFill>
+                  <a:srgbClr val="374151"/>
+                </a:solidFill>
+                <a:effectLst/>
+                <a:latin typeface="Arial" panose="020B0604020202020204" pitchFamily="34" charset="0"/>
+                <a:cs typeface="Arial" panose="020B0604020202020204" pitchFamily="34" charset="0"/>
+              </a:rPr>
+              <a:t> have longer series on average, which could indicate a dedicated audience that engages with content over an extended period.</a:t>
             </a:r>
           </a:p>
           <a:p>
@@ -6213,7 +6276,29 @@
                 <a:latin typeface="Arial" panose="020B0604020202020204" pitchFamily="34" charset="0"/>
                 <a:cs typeface="Arial" panose="020B0604020202020204" pitchFamily="34" charset="0"/>
               </a:rPr>
-              <a:t>Engagement Length</a:t>
+              <a:t>Engagement Length: Anime </a:t>
+            </a:r>
+            <a:r>
+              <a:rPr lang="en-SG" i="0" dirty="0">
+                <a:solidFill>
+                  <a:schemeClr val="tx1"/>
+                </a:solidFill>
+                <a:effectLst/>
+                <a:latin typeface="Arial" panose="020B0604020202020204" pitchFamily="34" charset="0"/>
+                <a:cs typeface="Arial" panose="020B0604020202020204" pitchFamily="34" charset="0"/>
+              </a:rPr>
+              <a:t>and</a:t>
+            </a:r>
+            <a:r>
+              <a:rPr lang="en-SG" b="1" i="0" dirty="0">
+                <a:solidFill>
+                  <a:schemeClr val="tx1"/>
+                </a:solidFill>
+                <a:effectLst/>
+                <a:latin typeface="Arial" panose="020B0604020202020204" pitchFamily="34" charset="0"/>
+                <a:cs typeface="Arial" panose="020B0604020202020204" pitchFamily="34" charset="0"/>
+              </a:rPr>
+              <a:t> Teen </a:t>
             </a:r>
             <a:r>
               <a:rPr lang="en-SG" b="0" i="0" dirty="0">
@@ -6224,7 +6309,7 @@
                 <a:latin typeface="Arial" panose="020B0604020202020204" pitchFamily="34" charset="0"/>
                 <a:cs typeface="Arial" panose="020B0604020202020204" pitchFamily="34" charset="0"/>
               </a:rPr>
-              <a:t>: Anime and Teen genres exhibit longer series, suggesting a dedicated audience for long-term storytelling.</a:t>
+              <a:t>genres exhibit longer series, suggesting a dedicated audience for long-term storytelling.</a:t>
             </a:r>
           </a:p>
           <a:p>

</xml_diff>